<commit_message>
adding distances script, adding new question for project
</commit_message>
<xml_diff>
--- a/reports/part1_slides.pptx
+++ b/reports/part1_slides.pptx
@@ -14584,28 +14584,7 @@
                 <a:cs typeface="Arial"/>
                 <a:sym typeface="Arial"/>
               </a:rPr>
-              <a:t>This project will focus on how COVID-19 </a:t>
-            </a:r>
-            <a:r>
-              <a:rPr lang="en-US">
-                <a:latin typeface="Arial"/>
-                <a:ea typeface="Arial"/>
-                <a:cs typeface="Arial"/>
-                <a:sym typeface="Arial"/>
-              </a:rPr>
-              <a:t>information </a:t>
-            </a:r>
-            <a:r>
-              <a:rPr lang="en-US">
-                <a:solidFill>
-                  <a:srgbClr val="000000"/>
-                </a:solidFill>
-                <a:latin typeface="Arial"/>
-                <a:ea typeface="Arial"/>
-                <a:cs typeface="Arial"/>
-                <a:sym typeface="Arial"/>
-              </a:rPr>
-              <a:t>was communicated within different countries, governmental reactions to the pandemic, and attitudes and risk perceptions people had towards the virus. The major questions to answer are how digital communications influenced people’s interpretation of the news, what their responses to the new laws and mandates were, and their beliefs and concerns about it versus other world issues.</a:t>
+              <a:t>This paper focuses on how COVID-19 information was communicated within and between different countries, reactions of governments to the pandemic, and attitudes and risk perceptions people had towards the virus. The major questions to answer are how digital communications influenced people’s interpretation of the news, what their responses were to the new laws and mandates, their beliefs and concerns about it versus other world issues, and the similarity and trends among the different countries.</a:t>
             </a:r>
             <a:endParaRPr i="1">
               <a:solidFill>
@@ -16108,6 +16087,285 @@
 </file>
 
 <file path=ppt/theme/theme2.xml><?xml version="1.0" encoding="utf-8"?>
+<a:theme xmlns:a="http://schemas.openxmlformats.org/drawingml/2006/main" xmlns:r="http://schemas.openxmlformats.org/officeDocument/2006/relationships" name="Office Theme">
+  <a:themeElements>
+    <a:clrScheme name="Office">
+      <a:dk1>
+        <a:srgbClr val="000000"/>
+      </a:dk1>
+      <a:lt1>
+        <a:srgbClr val="FFFFFF"/>
+      </a:lt1>
+      <a:dk2>
+        <a:srgbClr val="44546A"/>
+      </a:dk2>
+      <a:lt2>
+        <a:srgbClr val="E7E6E6"/>
+      </a:lt2>
+      <a:accent1>
+        <a:srgbClr val="4472C4"/>
+      </a:accent1>
+      <a:accent2>
+        <a:srgbClr val="ED7D31"/>
+      </a:accent2>
+      <a:accent3>
+        <a:srgbClr val="A5A5A5"/>
+      </a:accent3>
+      <a:accent4>
+        <a:srgbClr val="FFC000"/>
+      </a:accent4>
+      <a:accent5>
+        <a:srgbClr val="5B9BD5"/>
+      </a:accent5>
+      <a:accent6>
+        <a:srgbClr val="70AD47"/>
+      </a:accent6>
+      <a:hlink>
+        <a:srgbClr val="0563C1"/>
+      </a:hlink>
+      <a:folHlink>
+        <a:srgbClr val="954F72"/>
+      </a:folHlink>
+    </a:clrScheme>
+    <a:fontScheme name="Office">
+      <a:majorFont>
+        <a:latin typeface="Arial"/>
+        <a:ea typeface=""/>
+        <a:cs typeface=""/>
+        <a:font script="Jpan" typeface="ＭＳ Ｐゴシック"/>
+        <a:font script="Hang" typeface="맑은 고딕"/>
+        <a:font script="Hans" typeface="宋体"/>
+        <a:font script="Hant" typeface="新細明體"/>
+        <a:font script="Arab" typeface="Times New Roman"/>
+        <a:font script="Hebr" typeface="Times New Roman"/>
+        <a:font script="Thai" typeface="Angsana New"/>
+        <a:font script="Ethi" typeface="Nyala"/>
+        <a:font script="Beng" typeface="Vrinda"/>
+        <a:font script="Gujr" typeface="Shruti"/>
+        <a:font script="Khmr" typeface="MoolBoran"/>
+        <a:font script="Knda" typeface="Tunga"/>
+        <a:font script="Guru" typeface="Raavi"/>
+        <a:font script="Cans" typeface="Euphemia"/>
+        <a:font script="Cher" typeface="Plantagenet Cherokee"/>
+        <a:font script="Yiii" typeface="Microsoft Yi Baiti"/>
+        <a:font script="Tibt" typeface="Microsoft Himalaya"/>
+        <a:font script="Thaa" typeface="MV Boli"/>
+        <a:font script="Deva" typeface="Mangal"/>
+        <a:font script="Telu" typeface="Gautami"/>
+        <a:font script="Taml" typeface="Latha"/>
+        <a:font script="Syrc" typeface="Estrangelo Edessa"/>
+        <a:font script="Orya" typeface="Kalinga"/>
+        <a:font script="Mlym" typeface="Kartika"/>
+        <a:font script="Laoo" typeface="DokChampa"/>
+        <a:font script="Sinh" typeface="Iskoola Pota"/>
+        <a:font script="Mong" typeface="Mongolian Baiti"/>
+        <a:font script="Viet" typeface="Times New Roman"/>
+        <a:font script="Uigh" typeface="Microsoft Uighur"/>
+        <a:font script="Geor" typeface="Sylfaen"/>
+      </a:majorFont>
+      <a:minorFont>
+        <a:latin typeface="Arial"/>
+        <a:ea typeface=""/>
+        <a:cs typeface=""/>
+        <a:font script="Jpan" typeface="ＭＳ Ｐゴシック"/>
+        <a:font script="Hang" typeface="맑은 고딕"/>
+        <a:font script="Hans" typeface="宋体"/>
+        <a:font script="Hant" typeface="新細明體"/>
+        <a:font script="Arab" typeface="Arial"/>
+        <a:font script="Hebr" typeface="Arial"/>
+        <a:font script="Thai" typeface="Cordia New"/>
+        <a:font script="Ethi" typeface="Nyala"/>
+        <a:font script="Beng" typeface="Vrinda"/>
+        <a:font script="Gujr" typeface="Shruti"/>
+        <a:font script="Khmr" typeface="DaunPenh"/>
+        <a:font script="Knda" typeface="Tunga"/>
+        <a:font script="Guru" typeface="Raavi"/>
+        <a:font script="Cans" typeface="Euphemia"/>
+        <a:font script="Cher" typeface="Plantagenet Cherokee"/>
+        <a:font script="Yiii" typeface="Microsoft Yi Baiti"/>
+        <a:font script="Tibt" typeface="Microsoft Himalaya"/>
+        <a:font script="Thaa" typeface="MV Boli"/>
+        <a:font script="Deva" typeface="Mangal"/>
+        <a:font script="Telu" typeface="Gautami"/>
+        <a:font script="Taml" typeface="Latha"/>
+        <a:font script="Syrc" typeface="Estrangelo Edessa"/>
+        <a:font script="Orya" typeface="Kalinga"/>
+        <a:font script="Mlym" typeface="Kartika"/>
+        <a:font script="Laoo" typeface="DokChampa"/>
+        <a:font script="Sinh" typeface="Iskoola Pota"/>
+        <a:font script="Mong" typeface="Mongolian Baiti"/>
+        <a:font script="Viet" typeface="Arial"/>
+        <a:font script="Uigh" typeface="Microsoft Uighur"/>
+        <a:font script="Geor" typeface="Sylfaen"/>
+      </a:minorFont>
+    </a:fontScheme>
+    <a:fmtScheme name="Office">
+      <a:fillStyleLst>
+        <a:solidFill>
+          <a:schemeClr val="phClr"/>
+        </a:solidFill>
+        <a:gradFill rotWithShape="1">
+          <a:gsLst>
+            <a:gs pos="0">
+              <a:schemeClr val="phClr">
+                <a:tint val="50000"/>
+                <a:satMod val="300000"/>
+              </a:schemeClr>
+            </a:gs>
+            <a:gs pos="35000">
+              <a:schemeClr val="phClr">
+                <a:tint val="37000"/>
+                <a:satMod val="300000"/>
+              </a:schemeClr>
+            </a:gs>
+            <a:gs pos="100000">
+              <a:schemeClr val="phClr">
+                <a:tint val="15000"/>
+                <a:satMod val="350000"/>
+              </a:schemeClr>
+            </a:gs>
+          </a:gsLst>
+          <a:lin ang="16200000" scaled="1"/>
+        </a:gradFill>
+        <a:gradFill rotWithShape="1">
+          <a:gsLst>
+            <a:gs pos="0">
+              <a:schemeClr val="phClr">
+                <a:tint val="100000"/>
+                <a:shade val="100000"/>
+                <a:satMod val="130000"/>
+              </a:schemeClr>
+            </a:gs>
+            <a:gs pos="100000">
+              <a:schemeClr val="phClr">
+                <a:tint val="50000"/>
+                <a:shade val="100000"/>
+                <a:satMod val="350000"/>
+              </a:schemeClr>
+            </a:gs>
+          </a:gsLst>
+          <a:lin ang="16200000" scaled="0"/>
+        </a:gradFill>
+      </a:fillStyleLst>
+      <a:lnStyleLst>
+        <a:ln w="9525" cap="flat" cmpd="sng" algn="ctr">
+          <a:solidFill>
+            <a:schemeClr val="phClr">
+              <a:shade val="95000"/>
+              <a:satMod val="105000"/>
+            </a:schemeClr>
+          </a:solidFill>
+          <a:prstDash val="solid"/>
+        </a:ln>
+        <a:ln w="25400" cap="flat" cmpd="sng" algn="ctr">
+          <a:solidFill>
+            <a:schemeClr val="phClr"/>
+          </a:solidFill>
+          <a:prstDash val="solid"/>
+        </a:ln>
+        <a:ln w="38100" cap="flat" cmpd="sng" algn="ctr">
+          <a:solidFill>
+            <a:schemeClr val="phClr"/>
+          </a:solidFill>
+          <a:prstDash val="solid"/>
+        </a:ln>
+      </a:lnStyleLst>
+      <a:effectStyleLst>
+        <a:effectStyle>
+          <a:effectLst>
+            <a:outerShdw blurRad="40000" dist="20000" dir="5400000" rotWithShape="0">
+              <a:srgbClr val="000000">
+                <a:alpha val="38000"/>
+              </a:srgbClr>
+            </a:outerShdw>
+          </a:effectLst>
+        </a:effectStyle>
+        <a:effectStyle>
+          <a:effectLst>
+            <a:outerShdw blurRad="40000" dist="23000" dir="5400000" rotWithShape="0">
+              <a:srgbClr val="000000">
+                <a:alpha val="35000"/>
+              </a:srgbClr>
+            </a:outerShdw>
+          </a:effectLst>
+        </a:effectStyle>
+        <a:effectStyle>
+          <a:effectLst>
+            <a:outerShdw blurRad="40000" dist="23000" dir="5400000" rotWithShape="0">
+              <a:srgbClr val="000000">
+                <a:alpha val="35000"/>
+              </a:srgbClr>
+            </a:outerShdw>
+          </a:effectLst>
+          <a:scene3d>
+            <a:camera prst="orthographicFront">
+              <a:rot lat="0" lon="0" rev="0"/>
+            </a:camera>
+            <a:lightRig rig="threePt" dir="t">
+              <a:rot lat="0" lon="0" rev="1200000"/>
+            </a:lightRig>
+          </a:scene3d>
+          <a:sp3d>
+            <a:bevelT w="63500" h="25400"/>
+          </a:sp3d>
+        </a:effectStyle>
+      </a:effectStyleLst>
+      <a:bgFillStyleLst>
+        <a:solidFill>
+          <a:schemeClr val="phClr"/>
+        </a:solidFill>
+        <a:gradFill rotWithShape="1">
+          <a:gsLst>
+            <a:gs pos="0">
+              <a:schemeClr val="phClr">
+                <a:tint val="40000"/>
+                <a:satMod val="350000"/>
+              </a:schemeClr>
+            </a:gs>
+            <a:gs pos="40000">
+              <a:schemeClr val="phClr">
+                <a:tint val="45000"/>
+                <a:shade val="99000"/>
+                <a:satMod val="350000"/>
+              </a:schemeClr>
+            </a:gs>
+            <a:gs pos="100000">
+              <a:schemeClr val="phClr">
+                <a:shade val="20000"/>
+                <a:satMod val="255000"/>
+              </a:schemeClr>
+            </a:gs>
+          </a:gsLst>
+          <a:path path="circle">
+            <a:fillToRect l="50000" t="-80000" r="50000" b="180000"/>
+          </a:path>
+        </a:gradFill>
+        <a:gradFill rotWithShape="1">
+          <a:gsLst>
+            <a:gs pos="0">
+              <a:schemeClr val="phClr">
+                <a:tint val="80000"/>
+                <a:satMod val="300000"/>
+              </a:schemeClr>
+            </a:gs>
+            <a:gs pos="100000">
+              <a:schemeClr val="phClr">
+                <a:shade val="30000"/>
+                <a:satMod val="200000"/>
+              </a:schemeClr>
+            </a:gs>
+          </a:gsLst>
+          <a:path path="circle">
+            <a:fillToRect l="50000" t="50000" r="50000" b="50000"/>
+          </a:path>
+        </a:gradFill>
+      </a:bgFillStyleLst>
+    </a:fmtScheme>
+  </a:themeElements>
+</a:theme>
+</file>
+
+<file path=ppt/theme/theme3.xml><?xml version="1.0" encoding="utf-8"?>
 <a:theme xmlns:a="http://schemas.openxmlformats.org/drawingml/2006/main" xmlns:r="http://schemas.openxmlformats.org/officeDocument/2006/relationships">
   <a:themeElements>
     <a:clrScheme name="Default">
@@ -16384,283 +16642,4 @@
     </a:fmtScheme>
   </a:themeElements>
 </a:theme>
-</file>
-
-<file path=ppt/theme/theme3.xml><?xml version="1.0" encoding="utf-8"?>
-<a:theme xmlns:a="http://schemas.openxmlformats.org/drawingml/2006/main" xmlns:r="http://schemas.openxmlformats.org/officeDocument/2006/relationships" name="Office Theme">
-  <a:themeElements>
-    <a:clrScheme name="Office">
-      <a:dk1>
-        <a:srgbClr val="000000"/>
-      </a:dk1>
-      <a:lt1>
-        <a:srgbClr val="FFFFFF"/>
-      </a:lt1>
-      <a:dk2>
-        <a:srgbClr val="44546A"/>
-      </a:dk2>
-      <a:lt2>
-        <a:srgbClr val="E7E6E6"/>
-      </a:lt2>
-      <a:accent1>
-        <a:srgbClr val="4472C4"/>
-      </a:accent1>
-      <a:accent2>
-        <a:srgbClr val="ED7D31"/>
-      </a:accent2>
-      <a:accent3>
-        <a:srgbClr val="A5A5A5"/>
-      </a:accent3>
-      <a:accent4>
-        <a:srgbClr val="FFC000"/>
-      </a:accent4>
-      <a:accent5>
-        <a:srgbClr val="5B9BD5"/>
-      </a:accent5>
-      <a:accent6>
-        <a:srgbClr val="70AD47"/>
-      </a:accent6>
-      <a:hlink>
-        <a:srgbClr val="0563C1"/>
-      </a:hlink>
-      <a:folHlink>
-        <a:srgbClr val="954F72"/>
-      </a:folHlink>
-    </a:clrScheme>
-    <a:fontScheme name="Office">
-      <a:majorFont>
-        <a:latin typeface="Arial"/>
-        <a:ea typeface=""/>
-        <a:cs typeface=""/>
-        <a:font script="Jpan" typeface="ＭＳ Ｐゴシック"/>
-        <a:font script="Hang" typeface="맑은 고딕"/>
-        <a:font script="Hans" typeface="宋体"/>
-        <a:font script="Hant" typeface="新細明體"/>
-        <a:font script="Arab" typeface="Times New Roman"/>
-        <a:font script="Hebr" typeface="Times New Roman"/>
-        <a:font script="Thai" typeface="Angsana New"/>
-        <a:font script="Ethi" typeface="Nyala"/>
-        <a:font script="Beng" typeface="Vrinda"/>
-        <a:font script="Gujr" typeface="Shruti"/>
-        <a:font script="Khmr" typeface="MoolBoran"/>
-        <a:font script="Knda" typeface="Tunga"/>
-        <a:font script="Guru" typeface="Raavi"/>
-        <a:font script="Cans" typeface="Euphemia"/>
-        <a:font script="Cher" typeface="Plantagenet Cherokee"/>
-        <a:font script="Yiii" typeface="Microsoft Yi Baiti"/>
-        <a:font script="Tibt" typeface="Microsoft Himalaya"/>
-        <a:font script="Thaa" typeface="MV Boli"/>
-        <a:font script="Deva" typeface="Mangal"/>
-        <a:font script="Telu" typeface="Gautami"/>
-        <a:font script="Taml" typeface="Latha"/>
-        <a:font script="Syrc" typeface="Estrangelo Edessa"/>
-        <a:font script="Orya" typeface="Kalinga"/>
-        <a:font script="Mlym" typeface="Kartika"/>
-        <a:font script="Laoo" typeface="DokChampa"/>
-        <a:font script="Sinh" typeface="Iskoola Pota"/>
-        <a:font script="Mong" typeface="Mongolian Baiti"/>
-        <a:font script="Viet" typeface="Times New Roman"/>
-        <a:font script="Uigh" typeface="Microsoft Uighur"/>
-        <a:font script="Geor" typeface="Sylfaen"/>
-      </a:majorFont>
-      <a:minorFont>
-        <a:latin typeface="Arial"/>
-        <a:ea typeface=""/>
-        <a:cs typeface=""/>
-        <a:font script="Jpan" typeface="ＭＳ Ｐゴシック"/>
-        <a:font script="Hang" typeface="맑은 고딕"/>
-        <a:font script="Hans" typeface="宋体"/>
-        <a:font script="Hant" typeface="新細明體"/>
-        <a:font script="Arab" typeface="Arial"/>
-        <a:font script="Hebr" typeface="Arial"/>
-        <a:font script="Thai" typeface="Cordia New"/>
-        <a:font script="Ethi" typeface="Nyala"/>
-        <a:font script="Beng" typeface="Vrinda"/>
-        <a:font script="Gujr" typeface="Shruti"/>
-        <a:font script="Khmr" typeface="DaunPenh"/>
-        <a:font script="Knda" typeface="Tunga"/>
-        <a:font script="Guru" typeface="Raavi"/>
-        <a:font script="Cans" typeface="Euphemia"/>
-        <a:font script="Cher" typeface="Plantagenet Cherokee"/>
-        <a:font script="Yiii" typeface="Microsoft Yi Baiti"/>
-        <a:font script="Tibt" typeface="Microsoft Himalaya"/>
-        <a:font script="Thaa" typeface="MV Boli"/>
-        <a:font script="Deva" typeface="Mangal"/>
-        <a:font script="Telu" typeface="Gautami"/>
-        <a:font script="Taml" typeface="Latha"/>
-        <a:font script="Syrc" typeface="Estrangelo Edessa"/>
-        <a:font script="Orya" typeface="Kalinga"/>
-        <a:font script="Mlym" typeface="Kartika"/>
-        <a:font script="Laoo" typeface="DokChampa"/>
-        <a:font script="Sinh" typeface="Iskoola Pota"/>
-        <a:font script="Mong" typeface="Mongolian Baiti"/>
-        <a:font script="Viet" typeface="Arial"/>
-        <a:font script="Uigh" typeface="Microsoft Uighur"/>
-        <a:font script="Geor" typeface="Sylfaen"/>
-      </a:minorFont>
-    </a:fontScheme>
-    <a:fmtScheme name="Office">
-      <a:fillStyleLst>
-        <a:solidFill>
-          <a:schemeClr val="phClr"/>
-        </a:solidFill>
-        <a:gradFill rotWithShape="1">
-          <a:gsLst>
-            <a:gs pos="0">
-              <a:schemeClr val="phClr">
-                <a:tint val="50000"/>
-                <a:satMod val="300000"/>
-              </a:schemeClr>
-            </a:gs>
-            <a:gs pos="35000">
-              <a:schemeClr val="phClr">
-                <a:tint val="37000"/>
-                <a:satMod val="300000"/>
-              </a:schemeClr>
-            </a:gs>
-            <a:gs pos="100000">
-              <a:schemeClr val="phClr">
-                <a:tint val="15000"/>
-                <a:satMod val="350000"/>
-              </a:schemeClr>
-            </a:gs>
-          </a:gsLst>
-          <a:lin ang="16200000" scaled="1"/>
-        </a:gradFill>
-        <a:gradFill rotWithShape="1">
-          <a:gsLst>
-            <a:gs pos="0">
-              <a:schemeClr val="phClr">
-                <a:tint val="100000"/>
-                <a:shade val="100000"/>
-                <a:satMod val="130000"/>
-              </a:schemeClr>
-            </a:gs>
-            <a:gs pos="100000">
-              <a:schemeClr val="phClr">
-                <a:tint val="50000"/>
-                <a:shade val="100000"/>
-                <a:satMod val="350000"/>
-              </a:schemeClr>
-            </a:gs>
-          </a:gsLst>
-          <a:lin ang="16200000" scaled="0"/>
-        </a:gradFill>
-      </a:fillStyleLst>
-      <a:lnStyleLst>
-        <a:ln w="9525" cap="flat" cmpd="sng" algn="ctr">
-          <a:solidFill>
-            <a:schemeClr val="phClr">
-              <a:shade val="95000"/>
-              <a:satMod val="105000"/>
-            </a:schemeClr>
-          </a:solidFill>
-          <a:prstDash val="solid"/>
-        </a:ln>
-        <a:ln w="25400" cap="flat" cmpd="sng" algn="ctr">
-          <a:solidFill>
-            <a:schemeClr val="phClr"/>
-          </a:solidFill>
-          <a:prstDash val="solid"/>
-        </a:ln>
-        <a:ln w="38100" cap="flat" cmpd="sng" algn="ctr">
-          <a:solidFill>
-            <a:schemeClr val="phClr"/>
-          </a:solidFill>
-          <a:prstDash val="solid"/>
-        </a:ln>
-      </a:lnStyleLst>
-      <a:effectStyleLst>
-        <a:effectStyle>
-          <a:effectLst>
-            <a:outerShdw blurRad="40000" dist="20000" dir="5400000" rotWithShape="0">
-              <a:srgbClr val="000000">
-                <a:alpha val="38000"/>
-              </a:srgbClr>
-            </a:outerShdw>
-          </a:effectLst>
-        </a:effectStyle>
-        <a:effectStyle>
-          <a:effectLst>
-            <a:outerShdw blurRad="40000" dist="23000" dir="5400000" rotWithShape="0">
-              <a:srgbClr val="000000">
-                <a:alpha val="35000"/>
-              </a:srgbClr>
-            </a:outerShdw>
-          </a:effectLst>
-        </a:effectStyle>
-        <a:effectStyle>
-          <a:effectLst>
-            <a:outerShdw blurRad="40000" dist="23000" dir="5400000" rotWithShape="0">
-              <a:srgbClr val="000000">
-                <a:alpha val="35000"/>
-              </a:srgbClr>
-            </a:outerShdw>
-          </a:effectLst>
-          <a:scene3d>
-            <a:camera prst="orthographicFront">
-              <a:rot lat="0" lon="0" rev="0"/>
-            </a:camera>
-            <a:lightRig rig="threePt" dir="t">
-              <a:rot lat="0" lon="0" rev="1200000"/>
-            </a:lightRig>
-          </a:scene3d>
-          <a:sp3d>
-            <a:bevelT w="63500" h="25400"/>
-          </a:sp3d>
-        </a:effectStyle>
-      </a:effectStyleLst>
-      <a:bgFillStyleLst>
-        <a:solidFill>
-          <a:schemeClr val="phClr"/>
-        </a:solidFill>
-        <a:gradFill rotWithShape="1">
-          <a:gsLst>
-            <a:gs pos="0">
-              <a:schemeClr val="phClr">
-                <a:tint val="40000"/>
-                <a:satMod val="350000"/>
-              </a:schemeClr>
-            </a:gs>
-            <a:gs pos="40000">
-              <a:schemeClr val="phClr">
-                <a:tint val="45000"/>
-                <a:shade val="99000"/>
-                <a:satMod val="350000"/>
-              </a:schemeClr>
-            </a:gs>
-            <a:gs pos="100000">
-              <a:schemeClr val="phClr">
-                <a:shade val="20000"/>
-                <a:satMod val="255000"/>
-              </a:schemeClr>
-            </a:gs>
-          </a:gsLst>
-          <a:path path="circle">
-            <a:fillToRect l="50000" t="-80000" r="50000" b="180000"/>
-          </a:path>
-        </a:gradFill>
-        <a:gradFill rotWithShape="1">
-          <a:gsLst>
-            <a:gs pos="0">
-              <a:schemeClr val="phClr">
-                <a:tint val="80000"/>
-                <a:satMod val="300000"/>
-              </a:schemeClr>
-            </a:gs>
-            <a:gs pos="100000">
-              <a:schemeClr val="phClr">
-                <a:shade val="30000"/>
-                <a:satMod val="200000"/>
-              </a:schemeClr>
-            </a:gs>
-          </a:gsLst>
-          <a:path path="circle">
-            <a:fillToRect l="50000" t="50000" r="50000" b="50000"/>
-          </a:path>
-        </a:gradFill>
-      </a:bgFillStyleLst>
-    </a:fmtScheme>
-  </a:themeElements>
-</a:theme>
 </file>
</xml_diff>